<commit_message>
04-15.pptx - 2, 3페이지 추가
</commit_message>
<xml_diff>
--- a/ppt/04-15.pptx
+++ b/ppt/04-15.pptx
@@ -7,7 +7,10 @@
   <p:sldIdLst>
     <p:sldId id="258" r:id="rId2"/>
     <p:sldId id="261" r:id="rId3"/>
-    <p:sldId id="262" r:id="rId4"/>
+    <p:sldId id="263" r:id="rId4"/>
+    <p:sldId id="264" r:id="rId5"/>
+    <p:sldId id="265" r:id="rId6"/>
+    <p:sldId id="262" r:id="rId7"/>
   </p:sldIdLst>
   <p:sldSz cx="12192000" cy="6858000"/>
   <p:notesSz cx="6858000" cy="9144000"/>
@@ -3176,6 +3179,123 @@
           <a:chExt cx="0" cy="0"/>
         </a:xfrm>
       </p:grpSpPr>
+      <p:sp>
+        <p:nvSpPr>
+          <p:cNvPr id="2" name="TextBox 1"/>
+          <p:cNvSpPr txBox="1"/>
+          <p:nvPr/>
+        </p:nvSpPr>
+        <p:spPr>
+          <a:xfrm>
+            <a:off x="618067" y="397933"/>
+            <a:ext cx="3642344" cy="369332"/>
+          </a:xfrm>
+          <a:prstGeom prst="rect">
+            <a:avLst/>
+          </a:prstGeom>
+          <a:noFill/>
+        </p:spPr>
+        <p:txBody>
+          <a:bodyPr wrap="none" rtlCol="0">
+            <a:spAutoFit/>
+          </a:bodyPr>
+          <a:lstStyle/>
+          <a:p>
+            <a:r>
+              <a:rPr lang="en-US" altLang="ko-KR" dirty="0"/>
+              <a:t>UI-SJN-01-001U, UI-SJN-32-031L</a:t>
+            </a:r>
+            <a:endParaRPr lang="ko-KR" altLang="en-US" dirty="0"/>
+          </a:p>
+        </p:txBody>
+      </p:sp>
+      <p:pic>
+        <p:nvPicPr>
+          <p:cNvPr id="4" name="그림 3"/>
+          <p:cNvPicPr>
+            <a:picLocks noChangeAspect="1"/>
+          </p:cNvPicPr>
+          <p:nvPr/>
+        </p:nvPicPr>
+        <p:blipFill>
+          <a:blip r:embed="rId2"/>
+          <a:stretch>
+            <a:fillRect/>
+          </a:stretch>
+        </p:blipFill>
+        <p:spPr>
+          <a:xfrm>
+            <a:off x="705447" y="1115845"/>
+            <a:ext cx="3467584" cy="2391109"/>
+          </a:xfrm>
+          <a:prstGeom prst="rect">
+            <a:avLst/>
+          </a:prstGeom>
+        </p:spPr>
+      </p:pic>
+      <p:cxnSp>
+        <p:nvCxnSpPr>
+          <p:cNvPr id="6" name="직선 화살표 연결선 5"/>
+          <p:cNvCxnSpPr/>
+          <p:nvPr/>
+        </p:nvCxnSpPr>
+        <p:spPr>
+          <a:xfrm flipV="1">
+            <a:off x="1016000" y="3369733"/>
+            <a:ext cx="0" cy="939800"/>
+          </a:xfrm>
+          <a:prstGeom prst="straightConnector1">
+            <a:avLst/>
+          </a:prstGeom>
+          <a:ln>
+            <a:tailEnd type="triangle"/>
+          </a:ln>
+        </p:spPr>
+        <p:style>
+          <a:lnRef idx="1">
+            <a:schemeClr val="accent1"/>
+          </a:lnRef>
+          <a:fillRef idx="0">
+            <a:schemeClr val="accent1"/>
+          </a:fillRef>
+          <a:effectRef idx="0">
+            <a:schemeClr val="accent1"/>
+          </a:effectRef>
+          <a:fontRef idx="minor">
+            <a:schemeClr val="tx1"/>
+          </a:fontRef>
+        </p:style>
+      </p:cxnSp>
+      <p:sp>
+        <p:nvSpPr>
+          <p:cNvPr id="7" name="TextBox 6"/>
+          <p:cNvSpPr txBox="1"/>
+          <p:nvPr/>
+        </p:nvSpPr>
+        <p:spPr>
+          <a:xfrm>
+            <a:off x="1184712" y="3839633"/>
+            <a:ext cx="965329" cy="307777"/>
+          </a:xfrm>
+          <a:prstGeom prst="rect">
+            <a:avLst/>
+          </a:prstGeom>
+          <a:noFill/>
+        </p:spPr>
+        <p:txBody>
+          <a:bodyPr wrap="none" rtlCol="0">
+            <a:spAutoFit/>
+          </a:bodyPr>
+          <a:lstStyle/>
+          <a:p>
+            <a:r>
+              <a:rPr lang="ko-KR" altLang="en-US" sz="1400" dirty="0" smtClean="0"/>
+              <a:t>버튼 추가</a:t>
+            </a:r>
+            <a:endParaRPr lang="ko-KR" altLang="en-US" sz="1400" dirty="0"/>
+          </a:p>
+        </p:txBody>
+      </p:sp>
     </p:spTree>
     <p:extLst>
       <p:ext uri="{BB962C8B-B14F-4D97-AF65-F5344CB8AC3E}">
@@ -3190,6 +3310,308 @@
 </file>
 
 <file path=ppt/slides/slide3.xml><?xml version="1.0" encoding="utf-8"?>
+<p:sld xmlns:a="http://schemas.openxmlformats.org/drawingml/2006/main" xmlns:r="http://schemas.openxmlformats.org/officeDocument/2006/relationships" xmlns:p="http://schemas.openxmlformats.org/presentationml/2006/main">
+  <p:cSld>
+    <p:spTree>
+      <p:nvGrpSpPr>
+        <p:cNvPr id="1" name=""/>
+        <p:cNvGrpSpPr/>
+        <p:nvPr/>
+      </p:nvGrpSpPr>
+      <p:grpSpPr>
+        <a:xfrm>
+          <a:off x="0" y="0"/>
+          <a:ext cx="0" cy="0"/>
+          <a:chOff x="0" y="0"/>
+          <a:chExt cx="0" cy="0"/>
+        </a:xfrm>
+      </p:grpSpPr>
+      <p:pic>
+        <p:nvPicPr>
+          <p:cNvPr id="2" name="그림 1"/>
+          <p:cNvPicPr>
+            <a:picLocks noChangeAspect="1"/>
+          </p:cNvPicPr>
+          <p:nvPr/>
+        </p:nvPicPr>
+        <p:blipFill>
+          <a:blip r:embed="rId2"/>
+          <a:stretch>
+            <a:fillRect/>
+          </a:stretch>
+        </p:blipFill>
+        <p:spPr>
+          <a:xfrm>
+            <a:off x="618067" y="1157098"/>
+            <a:ext cx="3439005" cy="2715004"/>
+          </a:xfrm>
+          <a:prstGeom prst="rect">
+            <a:avLst/>
+          </a:prstGeom>
+        </p:spPr>
+      </p:pic>
+      <p:sp>
+        <p:nvSpPr>
+          <p:cNvPr id="3" name="TextBox 2"/>
+          <p:cNvSpPr txBox="1"/>
+          <p:nvPr/>
+        </p:nvSpPr>
+        <p:spPr>
+          <a:xfrm>
+            <a:off x="618067" y="397933"/>
+            <a:ext cx="1872629" cy="369332"/>
+          </a:xfrm>
+          <a:prstGeom prst="rect">
+            <a:avLst/>
+          </a:prstGeom>
+          <a:noFill/>
+        </p:spPr>
+        <p:txBody>
+          <a:bodyPr wrap="none" rtlCol="0">
+            <a:spAutoFit/>
+          </a:bodyPr>
+          <a:lstStyle/>
+          <a:p>
+            <a:r>
+              <a:rPr lang="en-US" altLang="ko-KR" dirty="0"/>
+              <a:t>UI-SJN-01-001U</a:t>
+            </a:r>
+            <a:endParaRPr lang="ko-KR" altLang="en-US" dirty="0"/>
+          </a:p>
+        </p:txBody>
+      </p:sp>
+      <p:cxnSp>
+        <p:nvCxnSpPr>
+          <p:cNvPr id="4" name="직선 화살표 연결선 3"/>
+          <p:cNvCxnSpPr/>
+          <p:nvPr/>
+        </p:nvCxnSpPr>
+        <p:spPr>
+          <a:xfrm flipV="1">
+            <a:off x="2387600" y="3903133"/>
+            <a:ext cx="0" cy="939800"/>
+          </a:xfrm>
+          <a:prstGeom prst="straightConnector1">
+            <a:avLst/>
+          </a:prstGeom>
+          <a:ln>
+            <a:tailEnd type="triangle"/>
+          </a:ln>
+        </p:spPr>
+        <p:style>
+          <a:lnRef idx="1">
+            <a:schemeClr val="accent1"/>
+          </a:lnRef>
+          <a:fillRef idx="0">
+            <a:schemeClr val="accent1"/>
+          </a:fillRef>
+          <a:effectRef idx="0">
+            <a:schemeClr val="accent1"/>
+          </a:effectRef>
+          <a:fontRef idx="minor">
+            <a:schemeClr val="tx1"/>
+          </a:fontRef>
+        </p:style>
+      </p:cxnSp>
+      <p:sp>
+        <p:nvSpPr>
+          <p:cNvPr id="5" name="TextBox 4"/>
+          <p:cNvSpPr txBox="1"/>
+          <p:nvPr/>
+        </p:nvSpPr>
+        <p:spPr>
+          <a:xfrm>
+            <a:off x="2556312" y="4373033"/>
+            <a:ext cx="2082621" cy="307777"/>
+          </a:xfrm>
+          <a:prstGeom prst="rect">
+            <a:avLst/>
+          </a:prstGeom>
+          <a:noFill/>
+        </p:spPr>
+        <p:txBody>
+          <a:bodyPr wrap="none" rtlCol="0">
+            <a:spAutoFit/>
+          </a:bodyPr>
+          <a:lstStyle/>
+          <a:p>
+            <a:r>
+              <a:rPr lang="ko-KR" altLang="en-US" sz="1400" dirty="0" smtClean="0"/>
+              <a:t>디자인이 변경됐습니다</a:t>
+            </a:r>
+            <a:r>
+              <a:rPr lang="en-US" altLang="ko-KR" sz="1400" dirty="0" smtClean="0"/>
+              <a:t>.</a:t>
+            </a:r>
+            <a:endParaRPr lang="ko-KR" altLang="en-US" sz="1400" dirty="0"/>
+          </a:p>
+        </p:txBody>
+      </p:sp>
+      <p:pic>
+        <p:nvPicPr>
+          <p:cNvPr id="6" name="그림 5"/>
+          <p:cNvPicPr>
+            <a:picLocks noChangeAspect="1"/>
+          </p:cNvPicPr>
+          <p:nvPr/>
+        </p:nvPicPr>
+        <p:blipFill>
+          <a:blip r:embed="rId3"/>
+          <a:stretch>
+            <a:fillRect/>
+          </a:stretch>
+        </p:blipFill>
+        <p:spPr>
+          <a:xfrm>
+            <a:off x="6940859" y="1076637"/>
+            <a:ext cx="3153215" cy="3096057"/>
+          </a:xfrm>
+          <a:prstGeom prst="rect">
+            <a:avLst/>
+          </a:prstGeom>
+        </p:spPr>
+      </p:pic>
+      <p:cxnSp>
+        <p:nvCxnSpPr>
+          <p:cNvPr id="7" name="직선 화살표 연결선 6"/>
+          <p:cNvCxnSpPr/>
+          <p:nvPr/>
+        </p:nvCxnSpPr>
+        <p:spPr>
+          <a:xfrm flipV="1">
+            <a:off x="7704666" y="3903133"/>
+            <a:ext cx="0" cy="939800"/>
+          </a:xfrm>
+          <a:prstGeom prst="straightConnector1">
+            <a:avLst/>
+          </a:prstGeom>
+          <a:ln>
+            <a:tailEnd type="triangle"/>
+          </a:ln>
+        </p:spPr>
+        <p:style>
+          <a:lnRef idx="1">
+            <a:schemeClr val="accent1"/>
+          </a:lnRef>
+          <a:fillRef idx="0">
+            <a:schemeClr val="accent1"/>
+          </a:fillRef>
+          <a:effectRef idx="0">
+            <a:schemeClr val="accent1"/>
+          </a:effectRef>
+          <a:fontRef idx="minor">
+            <a:schemeClr val="tx1"/>
+          </a:fontRef>
+        </p:style>
+      </p:cxnSp>
+      <p:sp>
+        <p:nvSpPr>
+          <p:cNvPr id="8" name="TextBox 7"/>
+          <p:cNvSpPr txBox="1"/>
+          <p:nvPr/>
+        </p:nvSpPr>
+        <p:spPr>
+          <a:xfrm>
+            <a:off x="7306112" y="4965699"/>
+            <a:ext cx="2082621" cy="307777"/>
+          </a:xfrm>
+          <a:prstGeom prst="rect">
+            <a:avLst/>
+          </a:prstGeom>
+          <a:noFill/>
+        </p:spPr>
+        <p:txBody>
+          <a:bodyPr wrap="none" rtlCol="0">
+            <a:spAutoFit/>
+          </a:bodyPr>
+          <a:lstStyle/>
+          <a:p>
+            <a:r>
+              <a:rPr lang="ko-KR" altLang="en-US" sz="1400" dirty="0" smtClean="0"/>
+              <a:t>이미지가 추가됐습니다</a:t>
+            </a:r>
+            <a:r>
+              <a:rPr lang="en-US" altLang="ko-KR" sz="1400" dirty="0" smtClean="0"/>
+              <a:t>.</a:t>
+            </a:r>
+            <a:endParaRPr lang="ko-KR" altLang="en-US" sz="1400" dirty="0"/>
+          </a:p>
+        </p:txBody>
+      </p:sp>
+    </p:spTree>
+    <p:extLst>
+      <p:ext uri="{BB962C8B-B14F-4D97-AF65-F5344CB8AC3E}">
+        <p14:creationId xmlns:p14="http://schemas.microsoft.com/office/powerpoint/2010/main" val="1857325514"/>
+      </p:ext>
+    </p:extLst>
+  </p:cSld>
+  <p:clrMapOvr>
+    <a:masterClrMapping/>
+  </p:clrMapOvr>
+</p:sld>
+</file>
+
+<file path=ppt/slides/slide4.xml><?xml version="1.0" encoding="utf-8"?>
+<p:sld xmlns:a="http://schemas.openxmlformats.org/drawingml/2006/main" xmlns:r="http://schemas.openxmlformats.org/officeDocument/2006/relationships" xmlns:p="http://schemas.openxmlformats.org/presentationml/2006/main">
+  <p:cSld>
+    <p:spTree>
+      <p:nvGrpSpPr>
+        <p:cNvPr id="1" name=""/>
+        <p:cNvGrpSpPr/>
+        <p:nvPr/>
+      </p:nvGrpSpPr>
+      <p:grpSpPr>
+        <a:xfrm>
+          <a:off x="0" y="0"/>
+          <a:ext cx="0" cy="0"/>
+          <a:chOff x="0" y="0"/>
+          <a:chExt cx="0" cy="0"/>
+        </a:xfrm>
+      </p:grpSpPr>
+    </p:spTree>
+    <p:extLst>
+      <p:ext uri="{BB962C8B-B14F-4D97-AF65-F5344CB8AC3E}">
+        <p14:creationId xmlns:p14="http://schemas.microsoft.com/office/powerpoint/2010/main" val="3585715882"/>
+      </p:ext>
+    </p:extLst>
+  </p:cSld>
+  <p:clrMapOvr>
+    <a:masterClrMapping/>
+  </p:clrMapOvr>
+</p:sld>
+</file>
+
+<file path=ppt/slides/slide5.xml><?xml version="1.0" encoding="utf-8"?>
+<p:sld xmlns:a="http://schemas.openxmlformats.org/drawingml/2006/main" xmlns:r="http://schemas.openxmlformats.org/officeDocument/2006/relationships" xmlns:p="http://schemas.openxmlformats.org/presentationml/2006/main">
+  <p:cSld>
+    <p:spTree>
+      <p:nvGrpSpPr>
+        <p:cNvPr id="1" name=""/>
+        <p:cNvGrpSpPr/>
+        <p:nvPr/>
+      </p:nvGrpSpPr>
+      <p:grpSpPr>
+        <a:xfrm>
+          <a:off x="0" y="0"/>
+          <a:ext cx="0" cy="0"/>
+          <a:chOff x="0" y="0"/>
+          <a:chExt cx="0" cy="0"/>
+        </a:xfrm>
+      </p:grpSpPr>
+    </p:spTree>
+    <p:extLst>
+      <p:ext uri="{BB962C8B-B14F-4D97-AF65-F5344CB8AC3E}">
+        <p14:creationId xmlns:p14="http://schemas.microsoft.com/office/powerpoint/2010/main" val="2460043135"/>
+      </p:ext>
+    </p:extLst>
+  </p:cSld>
+  <p:clrMapOvr>
+    <a:masterClrMapping/>
+  </p:clrMapOvr>
+</p:sld>
+</file>
+
+<file path=ppt/slides/slide6.xml><?xml version="1.0" encoding="utf-8"?>
 <p:sld xmlns:a="http://schemas.openxmlformats.org/drawingml/2006/main" xmlns:r="http://schemas.openxmlformats.org/officeDocument/2006/relationships" xmlns:p="http://schemas.openxmlformats.org/presentationml/2006/main">
   <p:cSld>
     <p:spTree>

</xml_diff>